<commit_message>
update part2 and 3
</commit_message>
<xml_diff>
--- a/img/normal.pptx
+++ b/img/normal.pptx
@@ -259,7 +259,7 @@
           <a:p>
             <a:fld id="{103900F8-3EC2-4C8A-92F9-78FD19991FB5}" type="datetimeFigureOut">
               <a:rPr lang="zh-CN" altLang="en-US" smtClean="0"/>
-              <a:t>2023/12/21</a:t>
+              <a:t>2023/12/24</a:t>
             </a:fld>
             <a:endParaRPr lang="zh-CN" altLang="en-US"/>
           </a:p>
@@ -457,7 +457,7 @@
           <a:p>
             <a:fld id="{103900F8-3EC2-4C8A-92F9-78FD19991FB5}" type="datetimeFigureOut">
               <a:rPr lang="zh-CN" altLang="en-US" smtClean="0"/>
-              <a:t>2023/12/21</a:t>
+              <a:t>2023/12/24</a:t>
             </a:fld>
             <a:endParaRPr lang="zh-CN" altLang="en-US"/>
           </a:p>
@@ -665,7 +665,7 @@
           <a:p>
             <a:fld id="{103900F8-3EC2-4C8A-92F9-78FD19991FB5}" type="datetimeFigureOut">
               <a:rPr lang="zh-CN" altLang="en-US" smtClean="0"/>
-              <a:t>2023/12/21</a:t>
+              <a:t>2023/12/24</a:t>
             </a:fld>
             <a:endParaRPr lang="zh-CN" altLang="en-US"/>
           </a:p>
@@ -863,7 +863,7 @@
           <a:p>
             <a:fld id="{103900F8-3EC2-4C8A-92F9-78FD19991FB5}" type="datetimeFigureOut">
               <a:rPr lang="zh-CN" altLang="en-US" smtClean="0"/>
-              <a:t>2023/12/21</a:t>
+              <a:t>2023/12/24</a:t>
             </a:fld>
             <a:endParaRPr lang="zh-CN" altLang="en-US"/>
           </a:p>
@@ -1138,7 +1138,7 @@
           <a:p>
             <a:fld id="{103900F8-3EC2-4C8A-92F9-78FD19991FB5}" type="datetimeFigureOut">
               <a:rPr lang="zh-CN" altLang="en-US" smtClean="0"/>
-              <a:t>2023/12/21</a:t>
+              <a:t>2023/12/24</a:t>
             </a:fld>
             <a:endParaRPr lang="zh-CN" altLang="en-US"/>
           </a:p>
@@ -1403,7 +1403,7 @@
           <a:p>
             <a:fld id="{103900F8-3EC2-4C8A-92F9-78FD19991FB5}" type="datetimeFigureOut">
               <a:rPr lang="zh-CN" altLang="en-US" smtClean="0"/>
-              <a:t>2023/12/21</a:t>
+              <a:t>2023/12/24</a:t>
             </a:fld>
             <a:endParaRPr lang="zh-CN" altLang="en-US"/>
           </a:p>
@@ -1815,7 +1815,7 @@
           <a:p>
             <a:fld id="{103900F8-3EC2-4C8A-92F9-78FD19991FB5}" type="datetimeFigureOut">
               <a:rPr lang="zh-CN" altLang="en-US" smtClean="0"/>
-              <a:t>2023/12/21</a:t>
+              <a:t>2023/12/24</a:t>
             </a:fld>
             <a:endParaRPr lang="zh-CN" altLang="en-US"/>
           </a:p>
@@ -1956,7 +1956,7 @@
           <a:p>
             <a:fld id="{103900F8-3EC2-4C8A-92F9-78FD19991FB5}" type="datetimeFigureOut">
               <a:rPr lang="zh-CN" altLang="en-US" smtClean="0"/>
-              <a:t>2023/12/21</a:t>
+              <a:t>2023/12/24</a:t>
             </a:fld>
             <a:endParaRPr lang="zh-CN" altLang="en-US"/>
           </a:p>
@@ -2069,7 +2069,7 @@
           <a:p>
             <a:fld id="{103900F8-3EC2-4C8A-92F9-78FD19991FB5}" type="datetimeFigureOut">
               <a:rPr lang="zh-CN" altLang="en-US" smtClean="0"/>
-              <a:t>2023/12/21</a:t>
+              <a:t>2023/12/24</a:t>
             </a:fld>
             <a:endParaRPr lang="zh-CN" altLang="en-US"/>
           </a:p>
@@ -2380,7 +2380,7 @@
           <a:p>
             <a:fld id="{103900F8-3EC2-4C8A-92F9-78FD19991FB5}" type="datetimeFigureOut">
               <a:rPr lang="zh-CN" altLang="en-US" smtClean="0"/>
-              <a:t>2023/12/21</a:t>
+              <a:t>2023/12/24</a:t>
             </a:fld>
             <a:endParaRPr lang="zh-CN" altLang="en-US"/>
           </a:p>
@@ -2668,7 +2668,7 @@
           <a:p>
             <a:fld id="{103900F8-3EC2-4C8A-92F9-78FD19991FB5}" type="datetimeFigureOut">
               <a:rPr lang="zh-CN" altLang="en-US" smtClean="0"/>
-              <a:t>2023/12/21</a:t>
+              <a:t>2023/12/24</a:t>
             </a:fld>
             <a:endParaRPr lang="zh-CN" altLang="en-US"/>
           </a:p>
@@ -2909,7 +2909,7 @@
           <a:p>
             <a:fld id="{103900F8-3EC2-4C8A-92F9-78FD19991FB5}" type="datetimeFigureOut">
               <a:rPr lang="zh-CN" altLang="en-US" smtClean="0"/>
-              <a:t>2023/12/21</a:t>
+              <a:t>2023/12/24</a:t>
             </a:fld>
             <a:endParaRPr lang="zh-CN" altLang="en-US"/>
           </a:p>
@@ -3354,7 +3354,7 @@
         </p:blipFill>
         <p:spPr>
           <a:xfrm>
-            <a:off x="1653026" y="0"/>
+            <a:off x="2786882" y="0"/>
             <a:ext cx="8885948" cy="6858000"/>
           </a:xfrm>
           <a:prstGeom prst="rect">
@@ -3364,10 +3364,10 @@
       </p:pic>
       <p:grpSp>
         <p:nvGrpSpPr>
-          <p:cNvPr id="10" name="组合 9">
-            <a:extLst>
-              <a:ext uri="{FF2B5EF4-FFF2-40B4-BE49-F238E27FC236}">
-                <a16:creationId xmlns:a16="http://schemas.microsoft.com/office/drawing/2014/main" id="{385F2A80-77F0-76DD-66C3-5B98DCB94005}"/>
+          <p:cNvPr id="9" name="组合 8">
+            <a:extLst>
+              <a:ext uri="{FF2B5EF4-FFF2-40B4-BE49-F238E27FC236}">
+                <a16:creationId xmlns:a16="http://schemas.microsoft.com/office/drawing/2014/main" id="{72480F38-2DA2-8C04-42EE-0E1E64FC1C3F}"/>
               </a:ext>
             </a:extLst>
           </p:cNvPr>
@@ -3375,100 +3375,8 @@
           <p:nvPr/>
         </p:nvGrpSpPr>
         <p:grpSpPr>
-          <a:xfrm rot="721334">
-            <a:off x="8719238" y="1167925"/>
-            <a:ext cx="1602761" cy="496377"/>
-            <a:chOff x="8707066" y="819422"/>
-            <a:chExt cx="1602761" cy="496377"/>
-          </a:xfrm>
-        </p:grpSpPr>
-        <p:pic>
-          <p:nvPicPr>
-            <p:cNvPr id="11" name="图片 10">
-              <a:extLst>
-                <a:ext uri="{FF2B5EF4-FFF2-40B4-BE49-F238E27FC236}">
-                  <a16:creationId xmlns:a16="http://schemas.microsoft.com/office/drawing/2014/main" id="{1FD544DB-E7FC-6CCB-59D3-6E61776DD951}"/>
-                </a:ext>
-              </a:extLst>
-            </p:cNvPr>
-            <p:cNvPicPr>
-              <a:picLocks noChangeAspect="1"/>
-            </p:cNvPicPr>
-            <p:nvPr/>
-          </p:nvPicPr>
-          <p:blipFill>
-            <a:blip r:embed="rId3">
-              <a:extLst>
-                <a:ext uri="{28A0092B-C50C-407E-A947-70E740481C1C}">
-                  <a14:useLocalDpi xmlns:a14="http://schemas.microsoft.com/office/drawing/2010/main" val="0"/>
-                </a:ext>
-              </a:extLst>
-            </a:blip>
-            <a:stretch>
-              <a:fillRect/>
-            </a:stretch>
-          </p:blipFill>
-          <p:spPr>
-            <a:xfrm rot="10311205">
-              <a:off x="8707066" y="819422"/>
-              <a:ext cx="1602761" cy="496377"/>
-            </a:xfrm>
-            <a:prstGeom prst="rect">
-              <a:avLst/>
-            </a:prstGeom>
-          </p:spPr>
-        </p:pic>
-        <p:sp>
-          <p:nvSpPr>
-            <p:cNvPr id="12" name="文本框 11">
-              <a:extLst>
-                <a:ext uri="{FF2B5EF4-FFF2-40B4-BE49-F238E27FC236}">
-                  <a16:creationId xmlns:a16="http://schemas.microsoft.com/office/drawing/2014/main" id="{45834E25-DEBD-2B87-B05F-6015CDC36497}"/>
-                </a:ext>
-              </a:extLst>
-            </p:cNvPr>
-            <p:cNvSpPr txBox="1"/>
-            <p:nvPr/>
-          </p:nvSpPr>
-          <p:spPr>
-            <a:xfrm rot="21104877">
-              <a:off x="8821594" y="890511"/>
-              <a:ext cx="1366993" cy="400110"/>
-            </a:xfrm>
-            <a:prstGeom prst="rect">
-              <a:avLst/>
-            </a:prstGeom>
-            <a:noFill/>
-          </p:spPr>
-          <p:txBody>
-            <a:bodyPr wrap="square" rtlCol="0">
-              <a:spAutoFit/>
-            </a:bodyPr>
-            <a:lstStyle/>
-            <a:p>
-              <a:r>
-                <a:rPr lang="zh-CN" altLang="en-US" sz="1000" dirty="0"/>
-                <a:t>大学生之间的距离在逐渐疏远</a:t>
-              </a:r>
-            </a:p>
-          </p:txBody>
-        </p:sp>
-      </p:grpSp>
-      <p:grpSp>
-        <p:nvGrpSpPr>
-          <p:cNvPr id="9" name="组合 8">
-            <a:extLst>
-              <a:ext uri="{FF2B5EF4-FFF2-40B4-BE49-F238E27FC236}">
-                <a16:creationId xmlns:a16="http://schemas.microsoft.com/office/drawing/2014/main" id="{72480F38-2DA2-8C04-42EE-0E1E64FC1C3F}"/>
-              </a:ext>
-            </a:extLst>
-          </p:cNvPr>
-          <p:cNvGrpSpPr/>
-          <p:nvPr/>
-        </p:nvGrpSpPr>
-        <p:grpSpPr>
-          <a:xfrm>
-            <a:off x="7363004" y="1577590"/>
+          <a:xfrm rot="21391979">
+            <a:off x="8169262" y="1566216"/>
             <a:ext cx="1602761" cy="496377"/>
             <a:chOff x="8707066" y="819422"/>
             <a:chExt cx="1602761" cy="496377"/>
@@ -3524,7 +3432,99 @@
           </p:nvSpPr>
           <p:spPr>
             <a:xfrm rot="21104877">
-              <a:off x="8821594" y="890511"/>
+              <a:off x="8821594" y="967455"/>
+              <a:ext cx="1366993" cy="246221"/>
+            </a:xfrm>
+            <a:prstGeom prst="rect">
+              <a:avLst/>
+            </a:prstGeom>
+            <a:noFill/>
+          </p:spPr>
+          <p:txBody>
+            <a:bodyPr wrap="square" rtlCol="0">
+              <a:spAutoFit/>
+            </a:bodyPr>
+            <a:lstStyle/>
+            <a:p>
+              <a:r>
+                <a:rPr lang="zh-CN" altLang="en-US" sz="1000" dirty="0"/>
+                <a:t>分享生活成为常态</a:t>
+              </a:r>
+            </a:p>
+          </p:txBody>
+        </p:sp>
+      </p:grpSp>
+      <p:grpSp>
+        <p:nvGrpSpPr>
+          <p:cNvPr id="13" name="组合 12">
+            <a:extLst>
+              <a:ext uri="{FF2B5EF4-FFF2-40B4-BE49-F238E27FC236}">
+                <a16:creationId xmlns:a16="http://schemas.microsoft.com/office/drawing/2014/main" id="{735C654B-09D8-7401-7EDF-3A53934F4FF0}"/>
+              </a:ext>
+            </a:extLst>
+          </p:cNvPr>
+          <p:cNvGrpSpPr/>
+          <p:nvPr/>
+        </p:nvGrpSpPr>
+        <p:grpSpPr>
+          <a:xfrm rot="952283">
+            <a:off x="8884785" y="3082645"/>
+            <a:ext cx="1602761" cy="698550"/>
+            <a:chOff x="8692739" y="618269"/>
+            <a:chExt cx="1602761" cy="698550"/>
+          </a:xfrm>
+        </p:grpSpPr>
+        <p:pic>
+          <p:nvPicPr>
+            <p:cNvPr id="14" name="图片 13">
+              <a:extLst>
+                <a:ext uri="{FF2B5EF4-FFF2-40B4-BE49-F238E27FC236}">
+                  <a16:creationId xmlns:a16="http://schemas.microsoft.com/office/drawing/2014/main" id="{5F263FCC-E456-92C6-A2A9-8E8A33EFA3F5}"/>
+                </a:ext>
+              </a:extLst>
+            </p:cNvPr>
+            <p:cNvPicPr>
+              <a:picLocks noChangeAspect="1"/>
+            </p:cNvPicPr>
+            <p:nvPr/>
+          </p:nvPicPr>
+          <p:blipFill>
+            <a:blip r:embed="rId3">
+              <a:extLst>
+                <a:ext uri="{28A0092B-C50C-407E-A947-70E740481C1C}">
+                  <a14:useLocalDpi xmlns:a14="http://schemas.microsoft.com/office/drawing/2010/main" val="0"/>
+                </a:ext>
+              </a:extLst>
+            </a:blip>
+            <a:stretch>
+              <a:fillRect/>
+            </a:stretch>
+          </p:blipFill>
+          <p:spPr>
+            <a:xfrm rot="10311205">
+              <a:off x="8692739" y="618269"/>
+              <a:ext cx="1602761" cy="698550"/>
+            </a:xfrm>
+            <a:prstGeom prst="rect">
+              <a:avLst/>
+            </a:prstGeom>
+          </p:spPr>
+        </p:pic>
+        <p:sp>
+          <p:nvSpPr>
+            <p:cNvPr id="15" name="文本框 14">
+              <a:extLst>
+                <a:ext uri="{FF2B5EF4-FFF2-40B4-BE49-F238E27FC236}">
+                  <a16:creationId xmlns:a16="http://schemas.microsoft.com/office/drawing/2014/main" id="{ED807FA8-242D-8CCF-E6CD-9AB6FCC92C7A}"/>
+                </a:ext>
+              </a:extLst>
+            </p:cNvPr>
+            <p:cNvSpPr txBox="1"/>
+            <p:nvPr/>
+          </p:nvSpPr>
+          <p:spPr>
+            <a:xfrm rot="21104877">
+              <a:off x="8798454" y="809631"/>
               <a:ext cx="1366993" cy="400110"/>
             </a:xfrm>
             <a:prstGeom prst="rect">
@@ -3540,99 +3540,7 @@
             <a:p>
               <a:r>
                 <a:rPr lang="zh-CN" altLang="en-US" sz="1000" dirty="0"/>
-                <a:t>攻略高度流量化，缺乏优质内容</a:t>
-              </a:r>
-            </a:p>
-          </p:txBody>
-        </p:sp>
-      </p:grpSp>
-      <p:grpSp>
-        <p:nvGrpSpPr>
-          <p:cNvPr id="13" name="组合 12">
-            <a:extLst>
-              <a:ext uri="{FF2B5EF4-FFF2-40B4-BE49-F238E27FC236}">
-                <a16:creationId xmlns:a16="http://schemas.microsoft.com/office/drawing/2014/main" id="{735C654B-09D8-7401-7EDF-3A53934F4FF0}"/>
-              </a:ext>
-            </a:extLst>
-          </p:cNvPr>
-          <p:cNvGrpSpPr/>
-          <p:nvPr/>
-        </p:nvGrpSpPr>
-        <p:grpSpPr>
-          <a:xfrm rot="721334">
-            <a:off x="8885404" y="2674047"/>
-            <a:ext cx="1602761" cy="496377"/>
-            <a:chOff x="8707066" y="819422"/>
-            <a:chExt cx="1602761" cy="496377"/>
-          </a:xfrm>
-        </p:grpSpPr>
-        <p:pic>
-          <p:nvPicPr>
-            <p:cNvPr id="14" name="图片 13">
-              <a:extLst>
-                <a:ext uri="{FF2B5EF4-FFF2-40B4-BE49-F238E27FC236}">
-                  <a16:creationId xmlns:a16="http://schemas.microsoft.com/office/drawing/2014/main" id="{5F263FCC-E456-92C6-A2A9-8E8A33EFA3F5}"/>
-                </a:ext>
-              </a:extLst>
-            </p:cNvPr>
-            <p:cNvPicPr>
-              <a:picLocks noChangeAspect="1"/>
-            </p:cNvPicPr>
-            <p:nvPr/>
-          </p:nvPicPr>
-          <p:blipFill>
-            <a:blip r:embed="rId3">
-              <a:extLst>
-                <a:ext uri="{28A0092B-C50C-407E-A947-70E740481C1C}">
-                  <a14:useLocalDpi xmlns:a14="http://schemas.microsoft.com/office/drawing/2010/main" val="0"/>
-                </a:ext>
-              </a:extLst>
-            </a:blip>
-            <a:stretch>
-              <a:fillRect/>
-            </a:stretch>
-          </p:blipFill>
-          <p:spPr>
-            <a:xfrm rot="10311205">
-              <a:off x="8707066" y="819422"/>
-              <a:ext cx="1602761" cy="496377"/>
-            </a:xfrm>
-            <a:prstGeom prst="rect">
-              <a:avLst/>
-            </a:prstGeom>
-          </p:spPr>
-        </p:pic>
-        <p:sp>
-          <p:nvSpPr>
-            <p:cNvPr id="15" name="文本框 14">
-              <a:extLst>
-                <a:ext uri="{FF2B5EF4-FFF2-40B4-BE49-F238E27FC236}">
-                  <a16:creationId xmlns:a16="http://schemas.microsoft.com/office/drawing/2014/main" id="{ED807FA8-242D-8CCF-E6CD-9AB6FCC92C7A}"/>
-                </a:ext>
-              </a:extLst>
-            </p:cNvPr>
-            <p:cNvSpPr txBox="1"/>
-            <p:nvPr/>
-          </p:nvSpPr>
-          <p:spPr>
-            <a:xfrm rot="21104877">
-              <a:off x="8821594" y="890511"/>
-              <a:ext cx="1366993" cy="400110"/>
-            </a:xfrm>
-            <a:prstGeom prst="rect">
-              <a:avLst/>
-            </a:prstGeom>
-            <a:noFill/>
-          </p:spPr>
-          <p:txBody>
-            <a:bodyPr wrap="square" rtlCol="0">
-              <a:spAutoFit/>
-            </a:bodyPr>
-            <a:lstStyle/>
-            <a:p>
-              <a:r>
-                <a:rPr lang="zh-CN" altLang="en-US" sz="1000" dirty="0"/>
-                <a:t>著名的“打卡点”人山人海</a:t>
+                <a:t>大家的朋友圈中分享的照片都很美观</a:t>
               </a:r>
             </a:p>
           </p:txBody>
@@ -3652,7 +3560,7 @@
         </p:nvGrpSpPr>
         <p:grpSpPr>
           <a:xfrm rot="615141">
-            <a:off x="7214287" y="2100784"/>
+            <a:off x="8266706" y="2219089"/>
             <a:ext cx="1602761" cy="695682"/>
             <a:chOff x="8707066" y="819422"/>
             <a:chExt cx="1602761" cy="496377"/>
@@ -3708,8 +3616,8 @@
           </p:nvSpPr>
           <p:spPr>
             <a:xfrm rot="21104877">
-              <a:off x="8773061" y="906619"/>
-              <a:ext cx="1463112" cy="395284"/>
+              <a:off x="8773061" y="961518"/>
+              <a:ext cx="1463112" cy="285483"/>
             </a:xfrm>
             <a:prstGeom prst="rect">
               <a:avLst/>
@@ -3724,283 +3632,15 @@
             <a:p>
               <a:r>
                 <a:rPr lang="zh-CN" altLang="en-US" sz="1000" dirty="0"/>
-                <a:t>尽管流量化的攻略在评论中口碑不佳，但仍收获大量浏览点赞</a:t>
+                <a:t>图片处理逐渐收获市场认可，</a:t>
               </a:r>
-            </a:p>
-          </p:txBody>
-        </p:sp>
-      </p:grpSp>
-      <p:grpSp>
-        <p:nvGrpSpPr>
-          <p:cNvPr id="20" name="组合 19">
-            <a:extLst>
-              <a:ext uri="{FF2B5EF4-FFF2-40B4-BE49-F238E27FC236}">
-                <a16:creationId xmlns:a16="http://schemas.microsoft.com/office/drawing/2014/main" id="{FAEDB3A8-AC0A-AC05-D791-0131089D1DF7}"/>
-              </a:ext>
-            </a:extLst>
-          </p:cNvPr>
-          <p:cNvGrpSpPr/>
-          <p:nvPr/>
-        </p:nvGrpSpPr>
-        <p:grpSpPr>
-          <a:xfrm>
-            <a:off x="8846248" y="1898569"/>
-            <a:ext cx="1602761" cy="496377"/>
-            <a:chOff x="8707066" y="819422"/>
-            <a:chExt cx="1602761" cy="496377"/>
-          </a:xfrm>
-        </p:grpSpPr>
-        <p:pic>
-          <p:nvPicPr>
-            <p:cNvPr id="21" name="图片 20">
-              <a:extLst>
-                <a:ext uri="{FF2B5EF4-FFF2-40B4-BE49-F238E27FC236}">
-                  <a16:creationId xmlns:a16="http://schemas.microsoft.com/office/drawing/2014/main" id="{7EE0899D-04B5-BCDA-BCE8-BF86208A379E}"/>
-                </a:ext>
-              </a:extLst>
-            </p:cNvPr>
-            <p:cNvPicPr>
-              <a:picLocks noChangeAspect="1"/>
-            </p:cNvPicPr>
-            <p:nvPr/>
-          </p:nvPicPr>
-          <p:blipFill>
-            <a:blip r:embed="rId3">
-              <a:extLst>
-                <a:ext uri="{28A0092B-C50C-407E-A947-70E740481C1C}">
-                  <a14:useLocalDpi xmlns:a14="http://schemas.microsoft.com/office/drawing/2010/main" val="0"/>
-                </a:ext>
-              </a:extLst>
-            </a:blip>
-            <a:stretch>
-              <a:fillRect/>
-            </a:stretch>
-          </p:blipFill>
-          <p:spPr>
-            <a:xfrm rot="10311205">
-              <a:off x="8707066" y="819422"/>
-              <a:ext cx="1602761" cy="496377"/>
-            </a:xfrm>
-            <a:prstGeom prst="rect">
-              <a:avLst/>
-            </a:prstGeom>
-          </p:spPr>
-        </p:pic>
-        <p:sp>
-          <p:nvSpPr>
-            <p:cNvPr id="22" name="文本框 21">
-              <a:extLst>
-                <a:ext uri="{FF2B5EF4-FFF2-40B4-BE49-F238E27FC236}">
-                  <a16:creationId xmlns:a16="http://schemas.microsoft.com/office/drawing/2014/main" id="{F37414A0-637A-AB0E-09D0-D45EA28AC1C7}"/>
-                </a:ext>
-              </a:extLst>
-            </p:cNvPr>
-            <p:cNvSpPr txBox="1"/>
-            <p:nvPr/>
-          </p:nvSpPr>
-          <p:spPr>
-            <a:xfrm rot="21104877">
-              <a:off x="8821594" y="890511"/>
-              <a:ext cx="1366993" cy="400110"/>
-            </a:xfrm>
-            <a:prstGeom prst="rect">
-              <a:avLst/>
-            </a:prstGeom>
-            <a:noFill/>
-          </p:spPr>
-          <p:txBody>
-            <a:bodyPr wrap="square" rtlCol="0">
-              <a:spAutoFit/>
-            </a:bodyPr>
-            <a:lstStyle/>
-            <a:p>
+              <a:r>
+                <a:rPr lang="en-US" altLang="zh-CN" sz="1000" dirty="0"/>
+                <a:t>P</a:t>
+              </a:r>
               <a:r>
                 <a:rPr lang="zh-CN" altLang="en-US" sz="1000" dirty="0"/>
-                <a:t>越来越多人靠着手机逛城市</a:t>
-              </a:r>
-            </a:p>
-          </p:txBody>
-        </p:sp>
-      </p:grpSp>
-      <p:grpSp>
-        <p:nvGrpSpPr>
-          <p:cNvPr id="29" name="组合 28">
-            <a:extLst>
-              <a:ext uri="{FF2B5EF4-FFF2-40B4-BE49-F238E27FC236}">
-                <a16:creationId xmlns:a16="http://schemas.microsoft.com/office/drawing/2014/main" id="{88EF2718-C228-6C64-B3D7-24EE61612CCD}"/>
-              </a:ext>
-            </a:extLst>
-          </p:cNvPr>
-          <p:cNvGrpSpPr/>
-          <p:nvPr/>
-        </p:nvGrpSpPr>
-        <p:grpSpPr>
-          <a:xfrm rot="890027">
-            <a:off x="8703751" y="3382128"/>
-            <a:ext cx="1602761" cy="695681"/>
-            <a:chOff x="8707065" y="831229"/>
-            <a:chExt cx="1602761" cy="496377"/>
-          </a:xfrm>
-        </p:grpSpPr>
-        <p:pic>
-          <p:nvPicPr>
-            <p:cNvPr id="30" name="图片 29">
-              <a:extLst>
-                <a:ext uri="{FF2B5EF4-FFF2-40B4-BE49-F238E27FC236}">
-                  <a16:creationId xmlns:a16="http://schemas.microsoft.com/office/drawing/2014/main" id="{B3A7D355-C965-5ACB-7C5E-C835CB33E96B}"/>
-                </a:ext>
-              </a:extLst>
-            </p:cNvPr>
-            <p:cNvPicPr>
-              <a:picLocks noChangeAspect="1"/>
-            </p:cNvPicPr>
-            <p:nvPr/>
-          </p:nvPicPr>
-          <p:blipFill>
-            <a:blip r:embed="rId3">
-              <a:extLst>
-                <a:ext uri="{28A0092B-C50C-407E-A947-70E740481C1C}">
-                  <a14:useLocalDpi xmlns:a14="http://schemas.microsoft.com/office/drawing/2010/main" val="0"/>
-                </a:ext>
-              </a:extLst>
-            </a:blip>
-            <a:stretch>
-              <a:fillRect/>
-            </a:stretch>
-          </p:blipFill>
-          <p:spPr>
-            <a:xfrm rot="10311205">
-              <a:off x="8707065" y="831229"/>
-              <a:ext cx="1602761" cy="496377"/>
-            </a:xfrm>
-            <a:prstGeom prst="rect">
-              <a:avLst/>
-            </a:prstGeom>
-          </p:spPr>
-        </p:pic>
-        <p:sp>
-          <p:nvSpPr>
-            <p:cNvPr id="31" name="文本框 30">
-              <a:extLst>
-                <a:ext uri="{FF2B5EF4-FFF2-40B4-BE49-F238E27FC236}">
-                  <a16:creationId xmlns:a16="http://schemas.microsoft.com/office/drawing/2014/main" id="{525D6D30-F8C4-0DBC-10C9-B1AA8BB54101}"/>
-                </a:ext>
-              </a:extLst>
-            </p:cNvPr>
-            <p:cNvSpPr txBox="1"/>
-            <p:nvPr/>
-          </p:nvSpPr>
-          <p:spPr>
-            <a:xfrm rot="21104877">
-              <a:off x="8769389" y="917582"/>
-              <a:ext cx="1478113" cy="395284"/>
-            </a:xfrm>
-            <a:prstGeom prst="rect">
-              <a:avLst/>
-            </a:prstGeom>
-            <a:noFill/>
-          </p:spPr>
-          <p:txBody>
-            <a:bodyPr wrap="square" rtlCol="0">
-              <a:spAutoFit/>
-            </a:bodyPr>
-            <a:lstStyle/>
-            <a:p>
-              <a:r>
-                <a:rPr lang="zh-CN" altLang="en-US" sz="1000" dirty="0"/>
-                <a:t>搜索相关攻略的结果大部分都是强行吸引流量，但并没有实际内容</a:t>
-              </a:r>
-            </a:p>
-          </p:txBody>
-        </p:sp>
-      </p:grpSp>
-      <p:grpSp>
-        <p:nvGrpSpPr>
-          <p:cNvPr id="23" name="组合 22">
-            <a:extLst>
-              <a:ext uri="{FF2B5EF4-FFF2-40B4-BE49-F238E27FC236}">
-                <a16:creationId xmlns:a16="http://schemas.microsoft.com/office/drawing/2014/main" id="{50C80290-5004-24DE-0A66-4A187FA3F578}"/>
-              </a:ext>
-            </a:extLst>
-          </p:cNvPr>
-          <p:cNvGrpSpPr/>
-          <p:nvPr/>
-        </p:nvGrpSpPr>
-        <p:grpSpPr>
-          <a:xfrm rot="1019518">
-            <a:off x="7484513" y="2888956"/>
-            <a:ext cx="1602761" cy="496181"/>
-            <a:chOff x="8673282" y="904614"/>
-            <a:chExt cx="1602761" cy="354031"/>
-          </a:xfrm>
-        </p:grpSpPr>
-        <p:pic>
-          <p:nvPicPr>
-            <p:cNvPr id="24" name="图片 23">
-              <a:extLst>
-                <a:ext uri="{FF2B5EF4-FFF2-40B4-BE49-F238E27FC236}">
-                  <a16:creationId xmlns:a16="http://schemas.microsoft.com/office/drawing/2014/main" id="{6E4F2160-0737-98B2-111E-2EF939EE8283}"/>
-                </a:ext>
-              </a:extLst>
-            </p:cNvPr>
-            <p:cNvPicPr>
-              <a:picLocks noChangeAspect="1"/>
-            </p:cNvPicPr>
-            <p:nvPr/>
-          </p:nvPicPr>
-          <p:blipFill>
-            <a:blip r:embed="rId3">
-              <a:extLst>
-                <a:ext uri="{28A0092B-C50C-407E-A947-70E740481C1C}">
-                  <a14:useLocalDpi xmlns:a14="http://schemas.microsoft.com/office/drawing/2010/main" val="0"/>
-                </a:ext>
-              </a:extLst>
-            </a:blip>
-            <a:stretch>
-              <a:fillRect/>
-            </a:stretch>
-          </p:blipFill>
-          <p:spPr>
-            <a:xfrm rot="10311205">
-              <a:off x="8673282" y="904614"/>
-              <a:ext cx="1602761" cy="354031"/>
-            </a:xfrm>
-            <a:prstGeom prst="rect">
-              <a:avLst/>
-            </a:prstGeom>
-          </p:spPr>
-        </p:pic>
-        <p:sp>
-          <p:nvSpPr>
-            <p:cNvPr id="25" name="文本框 24">
-              <a:extLst>
-                <a:ext uri="{FF2B5EF4-FFF2-40B4-BE49-F238E27FC236}">
-                  <a16:creationId xmlns:a16="http://schemas.microsoft.com/office/drawing/2014/main" id="{D22B1252-7A18-1B09-159E-4CCC7E55FEF3}"/>
-                </a:ext>
-              </a:extLst>
-            </p:cNvPr>
-            <p:cNvSpPr txBox="1"/>
-            <p:nvPr/>
-          </p:nvSpPr>
-          <p:spPr>
-            <a:xfrm rot="21104877">
-              <a:off x="8786168" y="956520"/>
-              <a:ext cx="1366993" cy="285483"/>
-            </a:xfrm>
-            <a:prstGeom prst="rect">
-              <a:avLst/>
-            </a:prstGeom>
-            <a:noFill/>
-          </p:spPr>
-          <p:txBody>
-            <a:bodyPr wrap="square" rtlCol="0">
-              <a:spAutoFit/>
-            </a:bodyPr>
-            <a:lstStyle/>
-            <a:p>
-              <a:r>
-                <a:rPr lang="zh-CN" altLang="en-US" sz="1000" dirty="0"/>
-                <a:t>用心制作的内容却得不到关注</a:t>
+                <a:t>图成为常态</a:t>
               </a:r>
             </a:p>
           </p:txBody>
@@ -4020,7 +3660,7 @@
         </p:nvGrpSpPr>
         <p:grpSpPr>
           <a:xfrm rot="857984">
-            <a:off x="4203209" y="816783"/>
+            <a:off x="5337065" y="816783"/>
             <a:ext cx="1602761" cy="650886"/>
             <a:chOff x="8710237" y="863029"/>
             <a:chExt cx="1602761" cy="464415"/>
@@ -4068,98 +3708,6 @@
               <a:extLst>
                 <a:ext uri="{FF2B5EF4-FFF2-40B4-BE49-F238E27FC236}">
                   <a16:creationId xmlns:a16="http://schemas.microsoft.com/office/drawing/2014/main" id="{052BBF3E-97C2-E0BF-7F8D-3E5884078876}"/>
-                </a:ext>
-              </a:extLst>
-            </p:cNvPr>
-            <p:cNvSpPr txBox="1"/>
-            <p:nvPr/>
-          </p:nvSpPr>
-          <p:spPr>
-            <a:xfrm rot="21104877">
-              <a:off x="8769389" y="972482"/>
-              <a:ext cx="1478113" cy="285483"/>
-            </a:xfrm>
-            <a:prstGeom prst="rect">
-              <a:avLst/>
-            </a:prstGeom>
-            <a:noFill/>
-          </p:spPr>
-          <p:txBody>
-            <a:bodyPr wrap="square" rtlCol="0">
-              <a:spAutoFit/>
-            </a:bodyPr>
-            <a:lstStyle/>
-            <a:p>
-              <a:r>
-                <a:rPr lang="zh-CN" altLang="en-US" sz="1000" dirty="0"/>
-                <a:t>热门攻略的打卡点全都是人，还是不去了吧</a:t>
-              </a:r>
-            </a:p>
-          </p:txBody>
-        </p:sp>
-      </p:grpSp>
-      <p:grpSp>
-        <p:nvGrpSpPr>
-          <p:cNvPr id="35" name="组合 34">
-            <a:extLst>
-              <a:ext uri="{FF2B5EF4-FFF2-40B4-BE49-F238E27FC236}">
-                <a16:creationId xmlns:a16="http://schemas.microsoft.com/office/drawing/2014/main" id="{9D72CD56-BF24-2EC7-AF8F-E7FC5869E787}"/>
-              </a:ext>
-            </a:extLst>
-          </p:cNvPr>
-          <p:cNvGrpSpPr/>
-          <p:nvPr/>
-        </p:nvGrpSpPr>
-        <p:grpSpPr>
-          <a:xfrm>
-            <a:off x="3582365" y="111490"/>
-            <a:ext cx="1602761" cy="695681"/>
-            <a:chOff x="8707065" y="831229"/>
-            <a:chExt cx="1602761" cy="496377"/>
-          </a:xfrm>
-        </p:grpSpPr>
-        <p:pic>
-          <p:nvPicPr>
-            <p:cNvPr id="36" name="图片 35">
-              <a:extLst>
-                <a:ext uri="{FF2B5EF4-FFF2-40B4-BE49-F238E27FC236}">
-                  <a16:creationId xmlns:a16="http://schemas.microsoft.com/office/drawing/2014/main" id="{C1550A9B-15B0-F991-02E9-424DF0EB3F4B}"/>
-                </a:ext>
-              </a:extLst>
-            </p:cNvPr>
-            <p:cNvPicPr>
-              <a:picLocks noChangeAspect="1"/>
-            </p:cNvPicPr>
-            <p:nvPr/>
-          </p:nvPicPr>
-          <p:blipFill>
-            <a:blip r:embed="rId3">
-              <a:extLst>
-                <a:ext uri="{28A0092B-C50C-407E-A947-70E740481C1C}">
-                  <a14:useLocalDpi xmlns:a14="http://schemas.microsoft.com/office/drawing/2010/main" val="0"/>
-                </a:ext>
-              </a:extLst>
-            </a:blip>
-            <a:stretch>
-              <a:fillRect/>
-            </a:stretch>
-          </p:blipFill>
-          <p:spPr>
-            <a:xfrm rot="10311205">
-              <a:off x="8707065" y="831229"/>
-              <a:ext cx="1602761" cy="496377"/>
-            </a:xfrm>
-            <a:prstGeom prst="rect">
-              <a:avLst/>
-            </a:prstGeom>
-          </p:spPr>
-        </p:pic>
-        <p:sp>
-          <p:nvSpPr>
-            <p:cNvPr id="37" name="文本框 36">
-              <a:extLst>
-                <a:ext uri="{FF2B5EF4-FFF2-40B4-BE49-F238E27FC236}">
-                  <a16:creationId xmlns:a16="http://schemas.microsoft.com/office/drawing/2014/main" id="{2EC4A8E8-D143-1BBF-AC06-4665286FF21F}"/>
                 </a:ext>
               </a:extLst>
             </p:cNvPr>
@@ -4184,7 +3732,15 @@
             <a:p>
               <a:r>
                 <a:rPr lang="zh-CN" altLang="en-US" sz="1000" dirty="0"/>
-                <a:t>这些攻略里的内容真的靠谱吗？</a:t>
+                <a:t>这些</a:t>
+              </a:r>
+              <a:r>
+                <a:rPr lang="en-US" altLang="zh-CN" sz="1000" dirty="0"/>
+                <a:t>P</a:t>
+              </a:r>
+              <a:r>
+                <a:rPr lang="zh-CN" altLang="en-US" sz="1000" dirty="0"/>
+                <a:t>图软件的界面看起来都好复杂呀</a:t>
               </a:r>
             </a:p>
           </p:txBody>
@@ -4204,7 +3760,7 @@
         </p:nvGrpSpPr>
         <p:grpSpPr>
           <a:xfrm rot="309682">
-            <a:off x="6079445" y="788181"/>
+            <a:off x="7213301" y="788181"/>
             <a:ext cx="1602761" cy="695681"/>
             <a:chOff x="8707065" y="831229"/>
             <a:chExt cx="1602761" cy="496377"/>
@@ -4260,7 +3816,99 @@
           </p:nvSpPr>
           <p:spPr>
             <a:xfrm rot="21104877">
-              <a:off x="8769389" y="972483"/>
+              <a:off x="8769390" y="917579"/>
+              <a:ext cx="1478113" cy="395284"/>
+            </a:xfrm>
+            <a:prstGeom prst="rect">
+              <a:avLst/>
+            </a:prstGeom>
+            <a:noFill/>
+          </p:spPr>
+          <p:txBody>
+            <a:bodyPr wrap="square" rtlCol="0">
+              <a:spAutoFit/>
+            </a:bodyPr>
+            <a:lstStyle/>
+            <a:p>
+              <a:r>
+                <a:rPr lang="zh-CN" altLang="en-US" sz="1000" dirty="0"/>
+                <a:t>为什么自己上手之后处理出来的感觉还是很塑料呢</a:t>
+              </a:r>
+            </a:p>
+          </p:txBody>
+        </p:sp>
+      </p:grpSp>
+      <p:grpSp>
+        <p:nvGrpSpPr>
+          <p:cNvPr id="44" name="组合 43">
+            <a:extLst>
+              <a:ext uri="{FF2B5EF4-FFF2-40B4-BE49-F238E27FC236}">
+                <a16:creationId xmlns:a16="http://schemas.microsoft.com/office/drawing/2014/main" id="{997158EF-31D8-FD13-3A77-9DB0C958B0A5}"/>
+              </a:ext>
+            </a:extLst>
+          </p:cNvPr>
+          <p:cNvGrpSpPr/>
+          <p:nvPr/>
+        </p:nvGrpSpPr>
+        <p:grpSpPr>
+          <a:xfrm rot="575630">
+            <a:off x="6941757" y="241942"/>
+            <a:ext cx="1602761" cy="506782"/>
+            <a:chOff x="8720448" y="965330"/>
+            <a:chExt cx="1602761" cy="361595"/>
+          </a:xfrm>
+        </p:grpSpPr>
+        <p:pic>
+          <p:nvPicPr>
+            <p:cNvPr id="45" name="图片 44">
+              <a:extLst>
+                <a:ext uri="{FF2B5EF4-FFF2-40B4-BE49-F238E27FC236}">
+                  <a16:creationId xmlns:a16="http://schemas.microsoft.com/office/drawing/2014/main" id="{1794DA4B-FE48-33CD-B748-432DB583057E}"/>
+                </a:ext>
+              </a:extLst>
+            </p:cNvPr>
+            <p:cNvPicPr>
+              <a:picLocks noChangeAspect="1"/>
+            </p:cNvPicPr>
+            <p:nvPr/>
+          </p:nvPicPr>
+          <p:blipFill>
+            <a:blip r:embed="rId3">
+              <a:extLst>
+                <a:ext uri="{28A0092B-C50C-407E-A947-70E740481C1C}">
+                  <a14:useLocalDpi xmlns:a14="http://schemas.microsoft.com/office/drawing/2010/main" val="0"/>
+                </a:ext>
+              </a:extLst>
+            </a:blip>
+            <a:stretch>
+              <a:fillRect/>
+            </a:stretch>
+          </p:blipFill>
+          <p:spPr>
+            <a:xfrm rot="10311205">
+              <a:off x="8720448" y="965330"/>
+              <a:ext cx="1602761" cy="361595"/>
+            </a:xfrm>
+            <a:prstGeom prst="rect">
+              <a:avLst/>
+            </a:prstGeom>
+          </p:spPr>
+        </p:pic>
+        <p:sp>
+          <p:nvSpPr>
+            <p:cNvPr id="46" name="文本框 45">
+              <a:extLst>
+                <a:ext uri="{FF2B5EF4-FFF2-40B4-BE49-F238E27FC236}">
+                  <a16:creationId xmlns:a16="http://schemas.microsoft.com/office/drawing/2014/main" id="{CD72E16D-D9DF-48DC-DF54-DBE4C39E7818}"/>
+                </a:ext>
+              </a:extLst>
+            </p:cNvPr>
+            <p:cNvSpPr txBox="1"/>
+            <p:nvPr/>
+          </p:nvSpPr>
+          <p:spPr>
+            <a:xfrm rot="21104877">
+              <a:off x="8786108" y="1012836"/>
               <a:ext cx="1478113" cy="285483"/>
             </a:xfrm>
             <a:prstGeom prst="rect">
@@ -4275,100 +3923,12 @@
             <a:lstStyle/>
             <a:p>
               <a:r>
-                <a:rPr lang="zh-CN" altLang="en-US" sz="1000" dirty="0"/>
-                <a:t>从数不清的攻略里筛选真正好的实在太麻烦了</a:t>
+                <a:rPr lang="en-US" altLang="zh-CN" sz="1000" dirty="0"/>
+                <a:t>P</a:t>
               </a:r>
-            </a:p>
-          </p:txBody>
-        </p:sp>
-      </p:grpSp>
-      <p:grpSp>
-        <p:nvGrpSpPr>
-          <p:cNvPr id="44" name="组合 43">
-            <a:extLst>
-              <a:ext uri="{FF2B5EF4-FFF2-40B4-BE49-F238E27FC236}">
-                <a16:creationId xmlns:a16="http://schemas.microsoft.com/office/drawing/2014/main" id="{997158EF-31D8-FD13-3A77-9DB0C958B0A5}"/>
-              </a:ext>
-            </a:extLst>
-          </p:cNvPr>
-          <p:cNvGrpSpPr/>
-          <p:nvPr/>
-        </p:nvGrpSpPr>
-        <p:grpSpPr>
-          <a:xfrm rot="848581">
-            <a:off x="5294619" y="68197"/>
-            <a:ext cx="1602761" cy="695681"/>
-            <a:chOff x="8707065" y="831229"/>
-            <a:chExt cx="1602761" cy="496377"/>
-          </a:xfrm>
-        </p:grpSpPr>
-        <p:pic>
-          <p:nvPicPr>
-            <p:cNvPr id="45" name="图片 44">
-              <a:extLst>
-                <a:ext uri="{FF2B5EF4-FFF2-40B4-BE49-F238E27FC236}">
-                  <a16:creationId xmlns:a16="http://schemas.microsoft.com/office/drawing/2014/main" id="{1794DA4B-FE48-33CD-B748-432DB583057E}"/>
-                </a:ext>
-              </a:extLst>
-            </p:cNvPr>
-            <p:cNvPicPr>
-              <a:picLocks noChangeAspect="1"/>
-            </p:cNvPicPr>
-            <p:nvPr/>
-          </p:nvPicPr>
-          <p:blipFill>
-            <a:blip r:embed="rId3">
-              <a:extLst>
-                <a:ext uri="{28A0092B-C50C-407E-A947-70E740481C1C}">
-                  <a14:useLocalDpi xmlns:a14="http://schemas.microsoft.com/office/drawing/2010/main" val="0"/>
-                </a:ext>
-              </a:extLst>
-            </a:blip>
-            <a:stretch>
-              <a:fillRect/>
-            </a:stretch>
-          </p:blipFill>
-          <p:spPr>
-            <a:xfrm rot="10311205">
-              <a:off x="8707065" y="831229"/>
-              <a:ext cx="1602761" cy="496377"/>
-            </a:xfrm>
-            <a:prstGeom prst="rect">
-              <a:avLst/>
-            </a:prstGeom>
-          </p:spPr>
-        </p:pic>
-        <p:sp>
-          <p:nvSpPr>
-            <p:cNvPr id="46" name="文本框 45">
-              <a:extLst>
-                <a:ext uri="{FF2B5EF4-FFF2-40B4-BE49-F238E27FC236}">
-                  <a16:creationId xmlns:a16="http://schemas.microsoft.com/office/drawing/2014/main" id="{CD72E16D-D9DF-48DC-DF54-DBE4C39E7818}"/>
-                </a:ext>
-              </a:extLst>
-            </p:cNvPr>
-            <p:cNvSpPr txBox="1"/>
-            <p:nvPr/>
-          </p:nvSpPr>
-          <p:spPr>
-            <a:xfrm rot="21104877">
-              <a:off x="8769389" y="972481"/>
-              <a:ext cx="1478113" cy="285483"/>
-            </a:xfrm>
-            <a:prstGeom prst="rect">
-              <a:avLst/>
-            </a:prstGeom>
-            <a:noFill/>
-          </p:spPr>
-          <p:txBody>
-            <a:bodyPr wrap="square" rtlCol="0">
-              <a:spAutoFit/>
-            </a:bodyPr>
-            <a:lstStyle/>
-            <a:p>
               <a:r>
                 <a:rPr lang="zh-CN" altLang="en-US" sz="1000" dirty="0"/>
-                <a:t>要是容易找到的攻略都有高质量的内容就好了</a:t>
+                <a:t>图水好深，没时间学习啊</a:t>
               </a:r>
             </a:p>
           </p:txBody>
@@ -4388,7 +3948,7 @@
         </p:nvGrpSpPr>
         <p:grpSpPr>
           <a:xfrm rot="1022300">
-            <a:off x="2563003" y="1703182"/>
+            <a:off x="3350292" y="1141636"/>
             <a:ext cx="1602761" cy="695681"/>
             <a:chOff x="8691802" y="853684"/>
             <a:chExt cx="1602761" cy="496377"/>
@@ -4444,8 +4004,8 @@
           </p:nvSpPr>
           <p:spPr>
             <a:xfrm rot="21104877">
-              <a:off x="8769855" y="922182"/>
-              <a:ext cx="1388274" cy="395284"/>
+              <a:off x="8769855" y="977083"/>
+              <a:ext cx="1388274" cy="285483"/>
             </a:xfrm>
             <a:prstGeom prst="rect">
               <a:avLst/>
@@ -4460,7 +4020,7 @@
             <a:p>
               <a:r>
                 <a:rPr lang="zh-CN" altLang="en-US" sz="1000" dirty="0"/>
-                <a:t>成天在外面瞎跑什么，打打游戏做做作业不好吗</a:t>
+                <a:t>你多分享点自己的生活嘛</a:t>
               </a:r>
             </a:p>
           </p:txBody>
@@ -4479,8 +4039,8 @@
           <p:nvPr/>
         </p:nvGrpSpPr>
         <p:grpSpPr>
-          <a:xfrm rot="21292676">
-            <a:off x="2532954" y="2694970"/>
+          <a:xfrm rot="220391">
+            <a:off x="3068771" y="1910684"/>
             <a:ext cx="1602761" cy="695681"/>
             <a:chOff x="8707065" y="831229"/>
             <a:chExt cx="1602761" cy="496377"/>
@@ -4536,8 +4096,8 @@
           </p:nvSpPr>
           <p:spPr>
             <a:xfrm rot="21104877">
-              <a:off x="8769389" y="1027384"/>
-              <a:ext cx="1478113" cy="175682"/>
+              <a:off x="8769389" y="972484"/>
+              <a:ext cx="1478113" cy="285483"/>
             </a:xfrm>
             <a:prstGeom prst="rect">
               <a:avLst/>
@@ -4552,7 +4112,7 @@
             <a:p>
               <a:r>
                 <a:rPr lang="zh-CN" altLang="en-US" sz="1000" dirty="0"/>
-                <a:t>用小红书的郭楠真虾头</a:t>
+                <a:t>你朋友圈的点赞为什么这么少呀</a:t>
               </a:r>
             </a:p>
           </p:txBody>
@@ -4572,10 +4132,10 @@
         </p:nvGrpSpPr>
         <p:grpSpPr>
           <a:xfrm rot="712504">
-            <a:off x="4311553" y="3568326"/>
-            <a:ext cx="1539616" cy="695681"/>
+            <a:off x="5446475" y="3558081"/>
+            <a:ext cx="1440042" cy="695681"/>
             <a:chOff x="8707886" y="839454"/>
-            <a:chExt cx="1539616" cy="496377"/>
+            <a:chExt cx="1440042" cy="496377"/>
           </a:xfrm>
         </p:grpSpPr>
         <p:pic>
@@ -4628,8 +4188,8 @@
           </p:nvSpPr>
           <p:spPr>
             <a:xfrm rot="21104877">
-              <a:off x="8769389" y="1027384"/>
-              <a:ext cx="1478113" cy="175682"/>
+              <a:off x="8770108" y="979601"/>
+              <a:ext cx="1339109" cy="285483"/>
             </a:xfrm>
             <a:prstGeom prst="rect">
               <a:avLst/>
@@ -4644,7 +4204,7 @@
             <a:p>
               <a:r>
                 <a:rPr lang="zh-CN" altLang="en-US" sz="1000" dirty="0"/>
-                <a:t>用小红书怎么你了？</a:t>
+                <a:t>我其实也是乐于分享的人</a:t>
               </a:r>
             </a:p>
           </p:txBody>
@@ -4664,7 +4224,7 @@
         </p:nvGrpSpPr>
         <p:grpSpPr>
           <a:xfrm rot="563647">
-            <a:off x="2276109" y="5892029"/>
+            <a:off x="2938075" y="5403973"/>
             <a:ext cx="1602761" cy="695681"/>
             <a:chOff x="8707065" y="831229"/>
             <a:chExt cx="1602761" cy="496377"/>
@@ -4720,8 +4280,8 @@
           </p:nvSpPr>
           <p:spPr>
             <a:xfrm rot="21104877">
-              <a:off x="8769389" y="1027384"/>
-              <a:ext cx="1478113" cy="175682"/>
+              <a:off x="8770126" y="1034668"/>
+              <a:ext cx="1335875" cy="175682"/>
             </a:xfrm>
             <a:prstGeom prst="rect">
               <a:avLst/>
@@ -4736,7 +4296,7 @@
             <a:p>
               <a:r>
                 <a:rPr lang="zh-CN" altLang="en-US" sz="1000" dirty="0"/>
-                <a:t>优质攻略难以寻找</a:t>
+                <a:t>互联网存在感低下</a:t>
               </a:r>
             </a:p>
           </p:txBody>
@@ -4756,7 +4316,7 @@
         </p:nvGrpSpPr>
         <p:grpSpPr>
           <a:xfrm rot="563647">
-            <a:off x="4028923" y="5892029"/>
+            <a:off x="3780088" y="6000803"/>
             <a:ext cx="1602761" cy="695681"/>
             <a:chOff x="8707065" y="831229"/>
             <a:chExt cx="1602761" cy="496377"/>
@@ -4827,8 +4387,12 @@
             <a:lstStyle/>
             <a:p>
               <a:r>
+                <a:rPr lang="en-US" altLang="zh-CN" sz="1000" dirty="0"/>
+                <a:t>P</a:t>
+              </a:r>
+              <a:r>
                 <a:rPr lang="zh-CN" altLang="en-US" sz="1000" dirty="0"/>
-                <a:t>受到对软件持有偏见者的恶语中伤</a:t>
+                <a:t>图太复杂，学习成本太高</a:t>
               </a:r>
             </a:p>
           </p:txBody>
@@ -4848,7 +4412,7 @@
         </p:nvGrpSpPr>
         <p:grpSpPr>
           <a:xfrm rot="563647">
-            <a:off x="6353967" y="5878673"/>
+            <a:off x="8144481" y="5802077"/>
             <a:ext cx="1602761" cy="695681"/>
             <a:chOff x="8707065" y="831229"/>
             <a:chExt cx="1602761" cy="496377"/>
@@ -4904,7 +4468,107 @@
           </p:nvSpPr>
           <p:spPr>
             <a:xfrm rot="21104877">
-              <a:off x="8769389" y="1027384"/>
+              <a:off x="8769390" y="972480"/>
+              <a:ext cx="1478113" cy="285483"/>
+            </a:xfrm>
+            <a:prstGeom prst="rect">
+              <a:avLst/>
+            </a:prstGeom>
+            <a:noFill/>
+          </p:spPr>
+          <p:txBody>
+            <a:bodyPr wrap="square" rtlCol="0">
+              <a:spAutoFit/>
+            </a:bodyPr>
+            <a:lstStyle/>
+            <a:p>
+              <a:r>
+                <a:rPr lang="zh-CN" altLang="en-US" sz="1000" dirty="0"/>
+                <a:t>能简单便捷地完成高质量</a:t>
+              </a:r>
+              <a:r>
+                <a:rPr lang="en-US" altLang="zh-CN" sz="1000" dirty="0"/>
+                <a:t>P</a:t>
+              </a:r>
+              <a:r>
+                <a:rPr lang="zh-CN" altLang="en-US" sz="1000" dirty="0"/>
+                <a:t>图的图片处理软件</a:t>
+              </a:r>
+            </a:p>
+          </p:txBody>
+        </p:sp>
+      </p:grpSp>
+      <p:grpSp>
+        <p:nvGrpSpPr>
+          <p:cNvPr id="2" name="组合 1">
+            <a:extLst>
+              <a:ext uri="{FF2B5EF4-FFF2-40B4-BE49-F238E27FC236}">
+                <a16:creationId xmlns:a16="http://schemas.microsoft.com/office/drawing/2014/main" id="{08A3CFEC-A1F8-0B22-68DC-7DE6C17E971A}"/>
+              </a:ext>
+            </a:extLst>
+          </p:cNvPr>
+          <p:cNvGrpSpPr/>
+          <p:nvPr/>
+        </p:nvGrpSpPr>
+        <p:grpSpPr>
+          <a:xfrm rot="243784">
+            <a:off x="5067106" y="279287"/>
+            <a:ext cx="1602761" cy="506782"/>
+            <a:chOff x="8720448" y="965330"/>
+            <a:chExt cx="1602761" cy="361595"/>
+          </a:xfrm>
+        </p:grpSpPr>
+        <p:pic>
+          <p:nvPicPr>
+            <p:cNvPr id="3" name="图片 2">
+              <a:extLst>
+                <a:ext uri="{FF2B5EF4-FFF2-40B4-BE49-F238E27FC236}">
+                  <a16:creationId xmlns:a16="http://schemas.microsoft.com/office/drawing/2014/main" id="{14048301-4FC7-3250-FF44-D9F18348F609}"/>
+                </a:ext>
+              </a:extLst>
+            </p:cNvPr>
+            <p:cNvPicPr>
+              <a:picLocks noChangeAspect="1"/>
+            </p:cNvPicPr>
+            <p:nvPr/>
+          </p:nvPicPr>
+          <p:blipFill>
+            <a:blip r:embed="rId3">
+              <a:extLst>
+                <a:ext uri="{28A0092B-C50C-407E-A947-70E740481C1C}">
+                  <a14:useLocalDpi xmlns:a14="http://schemas.microsoft.com/office/drawing/2010/main" val="0"/>
+                </a:ext>
+              </a:extLst>
+            </a:blip>
+            <a:stretch>
+              <a:fillRect/>
+            </a:stretch>
+          </p:blipFill>
+          <p:spPr>
+            <a:xfrm rot="10311205">
+              <a:off x="8720448" y="965330"/>
+              <a:ext cx="1602761" cy="361595"/>
+            </a:xfrm>
+            <a:prstGeom prst="rect">
+              <a:avLst/>
+            </a:prstGeom>
+          </p:spPr>
+        </p:pic>
+        <p:sp>
+          <p:nvSpPr>
+            <p:cNvPr id="4" name="文本框 3">
+              <a:extLst>
+                <a:ext uri="{FF2B5EF4-FFF2-40B4-BE49-F238E27FC236}">
+                  <a16:creationId xmlns:a16="http://schemas.microsoft.com/office/drawing/2014/main" id="{635CE818-134C-FCFE-2B10-BC12CEAC3276}"/>
+                </a:ext>
+              </a:extLst>
+            </p:cNvPr>
+            <p:cNvSpPr txBox="1"/>
+            <p:nvPr/>
+          </p:nvSpPr>
+          <p:spPr>
+            <a:xfrm rot="21104877">
+              <a:off x="8786108" y="1067736"/>
               <a:ext cx="1478113" cy="175682"/>
             </a:xfrm>
             <a:prstGeom prst="rect">
@@ -4920,7 +4584,7 @@
             <a:p>
               <a:r>
                 <a:rPr lang="zh-CN" altLang="en-US" sz="1000" dirty="0"/>
-                <a:t>流量与内容质量相匹配</a:t>
+                <a:t>他们的朋友圈都好好看</a:t>
               </a:r>
             </a:p>
           </p:txBody>
@@ -4928,10 +4592,10 @@
       </p:grpSp>
       <p:grpSp>
         <p:nvGrpSpPr>
-          <p:cNvPr id="77" name="组合 76">
-            <a:extLst>
-              <a:ext uri="{FF2B5EF4-FFF2-40B4-BE49-F238E27FC236}">
-                <a16:creationId xmlns:a16="http://schemas.microsoft.com/office/drawing/2014/main" id="{8CAC987B-20B7-F3F1-A23E-0BFF7D42BDEE}"/>
+          <p:cNvPr id="16" name="组合 15">
+            <a:extLst>
+              <a:ext uri="{FF2B5EF4-FFF2-40B4-BE49-F238E27FC236}">
+                <a16:creationId xmlns:a16="http://schemas.microsoft.com/office/drawing/2014/main" id="{D10286D1-07F2-7EC8-DFC5-6E5D57092826}"/>
               </a:ext>
             </a:extLst>
           </p:cNvPr>
@@ -4939,19 +4603,19 @@
           <p:nvPr/>
         </p:nvGrpSpPr>
         <p:grpSpPr>
-          <a:xfrm rot="563647">
-            <a:off x="8037993" y="5892028"/>
-            <a:ext cx="1602761" cy="695681"/>
-            <a:chOff x="8707065" y="831229"/>
-            <a:chExt cx="1602761" cy="496377"/>
+          <a:xfrm rot="848581">
+            <a:off x="3151891" y="2855967"/>
+            <a:ext cx="1602761" cy="506782"/>
+            <a:chOff x="8720448" y="965330"/>
+            <a:chExt cx="1602761" cy="361595"/>
           </a:xfrm>
         </p:grpSpPr>
         <p:pic>
           <p:nvPicPr>
-            <p:cNvPr id="78" name="图片 77">
+            <p:cNvPr id="26" name="图片 25">
               <a:extLst>
                 <a:ext uri="{FF2B5EF4-FFF2-40B4-BE49-F238E27FC236}">
-                  <a16:creationId xmlns:a16="http://schemas.microsoft.com/office/drawing/2014/main" id="{8DA8E967-C309-B09C-11FD-A806ABE3F547}"/>
+                  <a16:creationId xmlns:a16="http://schemas.microsoft.com/office/drawing/2014/main" id="{181B1ECD-1E29-C14D-B60F-7E12E8577807}"/>
                 </a:ext>
               </a:extLst>
             </p:cNvPr>
@@ -4974,8 +4638,8 @@
           </p:blipFill>
           <p:spPr>
             <a:xfrm rot="10311205">
-              <a:off x="8707065" y="831229"/>
-              <a:ext cx="1602761" cy="496377"/>
+              <a:off x="8720448" y="965330"/>
+              <a:ext cx="1602761" cy="361595"/>
             </a:xfrm>
             <a:prstGeom prst="rect">
               <a:avLst/>
@@ -4984,10 +4648,10 @@
         </p:pic>
         <p:sp>
           <p:nvSpPr>
-            <p:cNvPr id="79" name="文本框 78">
+            <p:cNvPr id="27" name="文本框 26">
               <a:extLst>
                 <a:ext uri="{FF2B5EF4-FFF2-40B4-BE49-F238E27FC236}">
-                  <a16:creationId xmlns:a16="http://schemas.microsoft.com/office/drawing/2014/main" id="{8B023CA1-6B58-99FC-4FD4-5E31B76CE59F}"/>
+                  <a16:creationId xmlns:a16="http://schemas.microsoft.com/office/drawing/2014/main" id="{5C5304AB-402B-A71C-D938-B6DEC86BAE05}"/>
                 </a:ext>
               </a:extLst>
             </p:cNvPr>
@@ -4996,7 +4660,99 @@
           </p:nvSpPr>
           <p:spPr>
             <a:xfrm rot="21104877">
-              <a:off x="8769390" y="972484"/>
+              <a:off x="8786108" y="1067736"/>
+              <a:ext cx="1478113" cy="175682"/>
+            </a:xfrm>
+            <a:prstGeom prst="rect">
+              <a:avLst/>
+            </a:prstGeom>
+            <a:noFill/>
+          </p:spPr>
+          <p:txBody>
+            <a:bodyPr wrap="square" rtlCol="0">
+              <a:spAutoFit/>
+            </a:bodyPr>
+            <a:lstStyle/>
+            <a:p>
+              <a:r>
+                <a:rPr lang="zh-CN" altLang="en-US" sz="1000" dirty="0"/>
+                <a:t>你分享的照片不好看</a:t>
+              </a:r>
+            </a:p>
+          </p:txBody>
+        </p:sp>
+      </p:grpSp>
+      <p:grpSp>
+        <p:nvGrpSpPr>
+          <p:cNvPr id="28" name="组合 27">
+            <a:extLst>
+              <a:ext uri="{FF2B5EF4-FFF2-40B4-BE49-F238E27FC236}">
+                <a16:creationId xmlns:a16="http://schemas.microsoft.com/office/drawing/2014/main" id="{85EC618F-8FB3-6C00-B976-AFACC34B602C}"/>
+              </a:ext>
+            </a:extLst>
+          </p:cNvPr>
+          <p:cNvGrpSpPr/>
+          <p:nvPr/>
+        </p:nvGrpSpPr>
+        <p:grpSpPr>
+          <a:xfrm rot="848581">
+            <a:off x="3513853" y="3450073"/>
+            <a:ext cx="1602761" cy="506782"/>
+            <a:chOff x="8720448" y="965330"/>
+            <a:chExt cx="1602761" cy="361595"/>
+          </a:xfrm>
+        </p:grpSpPr>
+        <p:pic>
+          <p:nvPicPr>
+            <p:cNvPr id="38" name="图片 37">
+              <a:extLst>
+                <a:ext uri="{FF2B5EF4-FFF2-40B4-BE49-F238E27FC236}">
+                  <a16:creationId xmlns:a16="http://schemas.microsoft.com/office/drawing/2014/main" id="{E7000F3C-A9CC-44AC-9774-6E9C35CF8A09}"/>
+                </a:ext>
+              </a:extLst>
+            </p:cNvPr>
+            <p:cNvPicPr>
+              <a:picLocks noChangeAspect="1"/>
+            </p:cNvPicPr>
+            <p:nvPr/>
+          </p:nvPicPr>
+          <p:blipFill>
+            <a:blip r:embed="rId3">
+              <a:extLst>
+                <a:ext uri="{28A0092B-C50C-407E-A947-70E740481C1C}">
+                  <a14:useLocalDpi xmlns:a14="http://schemas.microsoft.com/office/drawing/2010/main" val="0"/>
+                </a:ext>
+              </a:extLst>
+            </a:blip>
+            <a:stretch>
+              <a:fillRect/>
+            </a:stretch>
+          </p:blipFill>
+          <p:spPr>
+            <a:xfrm rot="10311205">
+              <a:off x="8720448" y="965330"/>
+              <a:ext cx="1602761" cy="361595"/>
+            </a:xfrm>
+            <a:prstGeom prst="rect">
+              <a:avLst/>
+            </a:prstGeom>
+          </p:spPr>
+        </p:pic>
+        <p:sp>
+          <p:nvSpPr>
+            <p:cNvPr id="39" name="文本框 38">
+              <a:extLst>
+                <a:ext uri="{FF2B5EF4-FFF2-40B4-BE49-F238E27FC236}">
+                  <a16:creationId xmlns:a16="http://schemas.microsoft.com/office/drawing/2014/main" id="{94D5B9B9-A6CF-CA52-B6C4-88A56D1AF528}"/>
+                </a:ext>
+              </a:extLst>
+            </p:cNvPr>
+            <p:cNvSpPr txBox="1"/>
+            <p:nvPr/>
+          </p:nvSpPr>
+          <p:spPr>
+            <a:xfrm rot="21104877">
+              <a:off x="8786108" y="1012836"/>
               <a:ext cx="1478113" cy="285483"/>
             </a:xfrm>
             <a:prstGeom prst="rect">
@@ -5012,7 +4768,777 @@
             <a:p>
               <a:r>
                 <a:rPr lang="zh-CN" altLang="en-US" sz="1000" dirty="0"/>
-                <a:t>营造优质的软件使用与舆论环境</a:t>
+                <a:t>让妈看看你最近过得怎么样</a:t>
+              </a:r>
+            </a:p>
+          </p:txBody>
+        </p:sp>
+      </p:grpSp>
+      <p:grpSp>
+        <p:nvGrpSpPr>
+          <p:cNvPr id="49" name="组合 48">
+            <a:extLst>
+              <a:ext uri="{FF2B5EF4-FFF2-40B4-BE49-F238E27FC236}">
+                <a16:creationId xmlns:a16="http://schemas.microsoft.com/office/drawing/2014/main" id="{126F178C-D890-C8FF-9378-032EBB4F7BB2}"/>
+              </a:ext>
+            </a:extLst>
+          </p:cNvPr>
+          <p:cNvGrpSpPr/>
+          <p:nvPr/>
+        </p:nvGrpSpPr>
+        <p:grpSpPr>
+          <a:xfrm rot="187566">
+            <a:off x="7299159" y="3514621"/>
+            <a:ext cx="1440042" cy="695681"/>
+            <a:chOff x="8707886" y="839454"/>
+            <a:chExt cx="1440042" cy="496377"/>
+          </a:xfrm>
+        </p:grpSpPr>
+        <p:pic>
+          <p:nvPicPr>
+            <p:cNvPr id="59" name="图片 58">
+              <a:extLst>
+                <a:ext uri="{FF2B5EF4-FFF2-40B4-BE49-F238E27FC236}">
+                  <a16:creationId xmlns:a16="http://schemas.microsoft.com/office/drawing/2014/main" id="{0EA7442B-88E7-DEB9-E858-7AC4D8B842DF}"/>
+                </a:ext>
+              </a:extLst>
+            </p:cNvPr>
+            <p:cNvPicPr>
+              <a:picLocks noChangeAspect="1"/>
+            </p:cNvPicPr>
+            <p:nvPr/>
+          </p:nvPicPr>
+          <p:blipFill>
+            <a:blip r:embed="rId3">
+              <a:extLst>
+                <a:ext uri="{28A0092B-C50C-407E-A947-70E740481C1C}">
+                  <a14:useLocalDpi xmlns:a14="http://schemas.microsoft.com/office/drawing/2010/main" val="0"/>
+                </a:ext>
+              </a:extLst>
+            </a:blip>
+            <a:stretch>
+              <a:fillRect/>
+            </a:stretch>
+          </p:blipFill>
+          <p:spPr>
+            <a:xfrm rot="10311205">
+              <a:off x="8707886" y="839454"/>
+              <a:ext cx="1440042" cy="496377"/>
+            </a:xfrm>
+            <a:prstGeom prst="rect">
+              <a:avLst/>
+            </a:prstGeom>
+          </p:spPr>
+        </p:pic>
+        <p:sp>
+          <p:nvSpPr>
+            <p:cNvPr id="60" name="文本框 59">
+              <a:extLst>
+                <a:ext uri="{FF2B5EF4-FFF2-40B4-BE49-F238E27FC236}">
+                  <a16:creationId xmlns:a16="http://schemas.microsoft.com/office/drawing/2014/main" id="{55D16E4A-9CAD-C63D-713E-C298421949CA}"/>
+                </a:ext>
+              </a:extLst>
+            </p:cNvPr>
+            <p:cNvSpPr txBox="1"/>
+            <p:nvPr/>
+          </p:nvSpPr>
+          <p:spPr>
+            <a:xfrm rot="21104877">
+              <a:off x="8770441" y="982894"/>
+              <a:ext cx="1274841" cy="285483"/>
+            </a:xfrm>
+            <a:prstGeom prst="rect">
+              <a:avLst/>
+            </a:prstGeom>
+            <a:noFill/>
+          </p:spPr>
+          <p:txBody>
+            <a:bodyPr wrap="square" rtlCol="0">
+              <a:spAutoFit/>
+            </a:bodyPr>
+            <a:lstStyle/>
+            <a:p>
+              <a:r>
+                <a:rPr lang="zh-CN" altLang="en-US" sz="1000" dirty="0"/>
+                <a:t>我会努力学习怎么</a:t>
+              </a:r>
+              <a:r>
+                <a:rPr lang="en-US" altLang="zh-CN" sz="1000" dirty="0"/>
+                <a:t>P</a:t>
+              </a:r>
+              <a:r>
+                <a:rPr lang="zh-CN" altLang="en-US" sz="1000" dirty="0"/>
+                <a:t>出好看的图片</a:t>
+              </a:r>
+            </a:p>
+          </p:txBody>
+        </p:sp>
+      </p:grpSp>
+      <p:grpSp>
+        <p:nvGrpSpPr>
+          <p:cNvPr id="61" name="组合 60">
+            <a:extLst>
+              <a:ext uri="{FF2B5EF4-FFF2-40B4-BE49-F238E27FC236}">
+                <a16:creationId xmlns:a16="http://schemas.microsoft.com/office/drawing/2014/main" id="{A71380D7-B3B1-D99B-BA88-698375E23103}"/>
+              </a:ext>
+            </a:extLst>
+          </p:cNvPr>
+          <p:cNvGrpSpPr/>
+          <p:nvPr/>
+        </p:nvGrpSpPr>
+        <p:grpSpPr>
+          <a:xfrm rot="531738">
+            <a:off x="6386731" y="4256058"/>
+            <a:ext cx="1440042" cy="695681"/>
+            <a:chOff x="8707886" y="839454"/>
+            <a:chExt cx="1440042" cy="496377"/>
+          </a:xfrm>
+        </p:grpSpPr>
+        <p:pic>
+          <p:nvPicPr>
+            <p:cNvPr id="65" name="图片 64">
+              <a:extLst>
+                <a:ext uri="{FF2B5EF4-FFF2-40B4-BE49-F238E27FC236}">
+                  <a16:creationId xmlns:a16="http://schemas.microsoft.com/office/drawing/2014/main" id="{E8B91C66-AA1A-7D59-4141-2B553FEC7D0D}"/>
+                </a:ext>
+              </a:extLst>
+            </p:cNvPr>
+            <p:cNvPicPr>
+              <a:picLocks noChangeAspect="1"/>
+            </p:cNvPicPr>
+            <p:nvPr/>
+          </p:nvPicPr>
+          <p:blipFill>
+            <a:blip r:embed="rId3">
+              <a:extLst>
+                <a:ext uri="{28A0092B-C50C-407E-A947-70E740481C1C}">
+                  <a14:useLocalDpi xmlns:a14="http://schemas.microsoft.com/office/drawing/2010/main" val="0"/>
+                </a:ext>
+              </a:extLst>
+            </a:blip>
+            <a:stretch>
+              <a:fillRect/>
+            </a:stretch>
+          </p:blipFill>
+          <p:spPr>
+            <a:xfrm rot="10311205">
+              <a:off x="8707886" y="839454"/>
+              <a:ext cx="1440042" cy="496377"/>
+            </a:xfrm>
+            <a:prstGeom prst="rect">
+              <a:avLst/>
+            </a:prstGeom>
+          </p:spPr>
+        </p:pic>
+        <p:sp>
+          <p:nvSpPr>
+            <p:cNvPr id="66" name="文本框 65">
+              <a:extLst>
+                <a:ext uri="{FF2B5EF4-FFF2-40B4-BE49-F238E27FC236}">
+                  <a16:creationId xmlns:a16="http://schemas.microsoft.com/office/drawing/2014/main" id="{B1A4C147-C38B-202B-B6E7-FDEEC453BDA4}"/>
+                </a:ext>
+              </a:extLst>
+            </p:cNvPr>
+            <p:cNvSpPr txBox="1"/>
+            <p:nvPr/>
+          </p:nvSpPr>
+          <p:spPr>
+            <a:xfrm rot="21104877">
+              <a:off x="8770441" y="1037793"/>
+              <a:ext cx="1274841" cy="175682"/>
+            </a:xfrm>
+            <a:prstGeom prst="rect">
+              <a:avLst/>
+            </a:prstGeom>
+            <a:noFill/>
+          </p:spPr>
+          <p:txBody>
+            <a:bodyPr wrap="square" rtlCol="0">
+              <a:spAutoFit/>
+            </a:bodyPr>
+            <a:lstStyle/>
+            <a:p>
+              <a:r>
+                <a:rPr lang="zh-CN" altLang="en-US" sz="1000" dirty="0"/>
+                <a:t>我也是有存在感的</a:t>
+              </a:r>
+            </a:p>
+          </p:txBody>
+        </p:sp>
+      </p:grpSp>
+      <p:sp>
+        <p:nvSpPr>
+          <p:cNvPr id="67" name="内容占位符 2">
+            <a:extLst>
+              <a:ext uri="{FF2B5EF4-FFF2-40B4-BE49-F238E27FC236}">
+                <a16:creationId xmlns:a16="http://schemas.microsoft.com/office/drawing/2014/main" id="{EDB629D5-4D57-BE48-A1D1-CE6FAFE70C9D}"/>
+              </a:ext>
+            </a:extLst>
+          </p:cNvPr>
+          <p:cNvSpPr txBox="1">
+            <a:spLocks/>
+          </p:cNvSpPr>
+          <p:nvPr/>
+        </p:nvSpPr>
+        <p:spPr>
+          <a:xfrm>
+            <a:off x="156541" y="248478"/>
+            <a:ext cx="2450551" cy="6500191"/>
+          </a:xfrm>
+          <a:prstGeom prst="rect">
+            <a:avLst/>
+          </a:prstGeom>
+        </p:spPr>
+        <p:txBody>
+          <a:bodyPr vert="horz" lIns="91440" tIns="45720" rIns="91440" bIns="45720" rtlCol="0">
+            <a:normAutofit fontScale="92500"/>
+          </a:bodyPr>
+          <a:lstStyle>
+            <a:lvl1pPr marL="0" indent="0" algn="ctr" defTabSz="914400" rtl="0" eaLnBrk="1" latinLnBrk="0" hangingPunct="1">
+              <a:lnSpc>
+                <a:spcPct val="90000"/>
+              </a:lnSpc>
+              <a:spcBef>
+                <a:spcPts val="1000"/>
+              </a:spcBef>
+              <a:buFont typeface="Arial" panose="020B0604020202020204" pitchFamily="34" charset="0"/>
+              <a:buNone/>
+              <a:defRPr sz="2400" kern="1200">
+                <a:solidFill>
+                  <a:schemeClr val="tx1"/>
+                </a:solidFill>
+                <a:latin typeface="+mn-lt"/>
+                <a:ea typeface="+mn-ea"/>
+                <a:cs typeface="+mn-cs"/>
+              </a:defRPr>
+            </a:lvl1pPr>
+            <a:lvl2pPr marL="457200" indent="0" algn="ctr" defTabSz="914400" rtl="0" eaLnBrk="1" latinLnBrk="0" hangingPunct="1">
+              <a:lnSpc>
+                <a:spcPct val="90000"/>
+              </a:lnSpc>
+              <a:spcBef>
+                <a:spcPts val="500"/>
+              </a:spcBef>
+              <a:buFont typeface="Arial" panose="020B0604020202020204" pitchFamily="34" charset="0"/>
+              <a:buNone/>
+              <a:defRPr sz="2000" kern="1200">
+                <a:solidFill>
+                  <a:schemeClr val="tx1"/>
+                </a:solidFill>
+                <a:latin typeface="+mn-lt"/>
+                <a:ea typeface="+mn-ea"/>
+                <a:cs typeface="+mn-cs"/>
+              </a:defRPr>
+            </a:lvl2pPr>
+            <a:lvl3pPr marL="914400" indent="0" algn="ctr" defTabSz="914400" rtl="0" eaLnBrk="1" latinLnBrk="0" hangingPunct="1">
+              <a:lnSpc>
+                <a:spcPct val="90000"/>
+              </a:lnSpc>
+              <a:spcBef>
+                <a:spcPts val="500"/>
+              </a:spcBef>
+              <a:buFont typeface="Arial" panose="020B0604020202020204" pitchFamily="34" charset="0"/>
+              <a:buNone/>
+              <a:defRPr sz="1800" kern="1200">
+                <a:solidFill>
+                  <a:schemeClr val="tx1"/>
+                </a:solidFill>
+                <a:latin typeface="+mn-lt"/>
+                <a:ea typeface="+mn-ea"/>
+                <a:cs typeface="+mn-cs"/>
+              </a:defRPr>
+            </a:lvl3pPr>
+            <a:lvl4pPr marL="1371600" indent="0" algn="ctr" defTabSz="914400" rtl="0" eaLnBrk="1" latinLnBrk="0" hangingPunct="1">
+              <a:lnSpc>
+                <a:spcPct val="90000"/>
+              </a:lnSpc>
+              <a:spcBef>
+                <a:spcPts val="500"/>
+              </a:spcBef>
+              <a:buFont typeface="Arial" panose="020B0604020202020204" pitchFamily="34" charset="0"/>
+              <a:buNone/>
+              <a:defRPr sz="1600" kern="1200">
+                <a:solidFill>
+                  <a:schemeClr val="tx1"/>
+                </a:solidFill>
+                <a:latin typeface="+mn-lt"/>
+                <a:ea typeface="+mn-ea"/>
+                <a:cs typeface="+mn-cs"/>
+              </a:defRPr>
+            </a:lvl4pPr>
+            <a:lvl5pPr marL="1828800" indent="0" algn="ctr" defTabSz="914400" rtl="0" eaLnBrk="1" latinLnBrk="0" hangingPunct="1">
+              <a:lnSpc>
+                <a:spcPct val="90000"/>
+              </a:lnSpc>
+              <a:spcBef>
+                <a:spcPts val="500"/>
+              </a:spcBef>
+              <a:buFont typeface="Arial" panose="020B0604020202020204" pitchFamily="34" charset="0"/>
+              <a:buNone/>
+              <a:defRPr sz="1600" kern="1200">
+                <a:solidFill>
+                  <a:schemeClr val="tx1"/>
+                </a:solidFill>
+                <a:latin typeface="+mn-lt"/>
+                <a:ea typeface="+mn-ea"/>
+                <a:cs typeface="+mn-cs"/>
+              </a:defRPr>
+            </a:lvl5pPr>
+            <a:lvl6pPr marL="2286000" indent="0" algn="ctr" defTabSz="914400" rtl="0" eaLnBrk="1" latinLnBrk="0" hangingPunct="1">
+              <a:lnSpc>
+                <a:spcPct val="90000"/>
+              </a:lnSpc>
+              <a:spcBef>
+                <a:spcPts val="500"/>
+              </a:spcBef>
+              <a:buFont typeface="Arial" panose="020B0604020202020204" pitchFamily="34" charset="0"/>
+              <a:buNone/>
+              <a:defRPr sz="1600" kern="1200">
+                <a:solidFill>
+                  <a:schemeClr val="tx1"/>
+                </a:solidFill>
+                <a:latin typeface="+mn-lt"/>
+                <a:ea typeface="+mn-ea"/>
+                <a:cs typeface="+mn-cs"/>
+              </a:defRPr>
+            </a:lvl6pPr>
+            <a:lvl7pPr marL="2743200" indent="0" algn="ctr" defTabSz="914400" rtl="0" eaLnBrk="1" latinLnBrk="0" hangingPunct="1">
+              <a:lnSpc>
+                <a:spcPct val="90000"/>
+              </a:lnSpc>
+              <a:spcBef>
+                <a:spcPts val="500"/>
+              </a:spcBef>
+              <a:buFont typeface="Arial" panose="020B0604020202020204" pitchFamily="34" charset="0"/>
+              <a:buNone/>
+              <a:defRPr sz="1600" kern="1200">
+                <a:solidFill>
+                  <a:schemeClr val="tx1"/>
+                </a:solidFill>
+                <a:latin typeface="+mn-lt"/>
+                <a:ea typeface="+mn-ea"/>
+                <a:cs typeface="+mn-cs"/>
+              </a:defRPr>
+            </a:lvl7pPr>
+            <a:lvl8pPr marL="3200400" indent="0" algn="ctr" defTabSz="914400" rtl="0" eaLnBrk="1" latinLnBrk="0" hangingPunct="1">
+              <a:lnSpc>
+                <a:spcPct val="90000"/>
+              </a:lnSpc>
+              <a:spcBef>
+                <a:spcPts val="500"/>
+              </a:spcBef>
+              <a:buFont typeface="Arial" panose="020B0604020202020204" pitchFamily="34" charset="0"/>
+              <a:buNone/>
+              <a:defRPr sz="1600" kern="1200">
+                <a:solidFill>
+                  <a:schemeClr val="tx1"/>
+                </a:solidFill>
+                <a:latin typeface="+mn-lt"/>
+                <a:ea typeface="+mn-ea"/>
+                <a:cs typeface="+mn-cs"/>
+              </a:defRPr>
+            </a:lvl8pPr>
+            <a:lvl9pPr marL="3657600" indent="0" algn="ctr" defTabSz="914400" rtl="0" eaLnBrk="1" latinLnBrk="0" hangingPunct="1">
+              <a:lnSpc>
+                <a:spcPct val="90000"/>
+              </a:lnSpc>
+              <a:spcBef>
+                <a:spcPts val="500"/>
+              </a:spcBef>
+              <a:buFont typeface="Arial" panose="020B0604020202020204" pitchFamily="34" charset="0"/>
+              <a:buNone/>
+              <a:defRPr sz="1600" kern="1200">
+                <a:solidFill>
+                  <a:schemeClr val="tx1"/>
+                </a:solidFill>
+                <a:latin typeface="+mn-lt"/>
+                <a:ea typeface="+mn-ea"/>
+                <a:cs typeface="+mn-cs"/>
+              </a:defRPr>
+            </a:lvl9pPr>
+          </a:lstStyle>
+          <a:p>
+            <a:r>
+              <a:rPr lang="zh-CN" altLang="en-US" b="1" dirty="0"/>
+              <a:t>看：</a:t>
+            </a:r>
+            <a:r>
+              <a:rPr lang="zh-CN" altLang="en-US" dirty="0"/>
+              <a:t>分享与</a:t>
+            </a:r>
+            <a:r>
+              <a:rPr lang="en-US" altLang="zh-CN" dirty="0"/>
+              <a:t>P</a:t>
+            </a:r>
+            <a:r>
+              <a:rPr lang="zh-CN" altLang="en-US" dirty="0"/>
+              <a:t>图成为常态、图片处理获得认可、朋友圈图片美观度提升</a:t>
+            </a:r>
+            <a:endParaRPr lang="en-US" altLang="zh-CN" dirty="0"/>
+          </a:p>
+          <a:p>
+            <a:r>
+              <a:rPr lang="zh-CN" altLang="en-US" b="1" dirty="0"/>
+              <a:t>听：</a:t>
+            </a:r>
+            <a:r>
+              <a:rPr lang="zh-CN" altLang="en-US" dirty="0"/>
+              <a:t>分享质量低、催分享、无存在感</a:t>
+            </a:r>
+            <a:endParaRPr lang="en-US" altLang="zh-CN" dirty="0"/>
+          </a:p>
+          <a:p>
+            <a:r>
+              <a:rPr lang="zh-CN" altLang="en-US" b="1" dirty="0"/>
+              <a:t>想法</a:t>
+            </a:r>
+            <a:r>
+              <a:rPr lang="en-US" altLang="zh-CN" b="1" dirty="0"/>
+              <a:t>&amp;</a:t>
+            </a:r>
+            <a:r>
+              <a:rPr lang="zh-CN" altLang="en-US" b="1" dirty="0"/>
+              <a:t>感觉：</a:t>
+            </a:r>
+            <a:r>
+              <a:rPr lang="zh-CN" altLang="en-US" dirty="0"/>
+              <a:t>想分享但质量不足、想</a:t>
+            </a:r>
+            <a:r>
+              <a:rPr lang="en-US" altLang="zh-CN" dirty="0"/>
+              <a:t>P</a:t>
+            </a:r>
+            <a:r>
+              <a:rPr lang="zh-CN" altLang="en-US" dirty="0"/>
+              <a:t>图但太复杂、水太深、没时间学习</a:t>
+            </a:r>
+            <a:endParaRPr lang="en-US" altLang="zh-CN" b="1" dirty="0"/>
+          </a:p>
+          <a:p>
+            <a:r>
+              <a:rPr lang="zh-CN" altLang="en-US" b="1" dirty="0"/>
+              <a:t>说</a:t>
+            </a:r>
+            <a:r>
+              <a:rPr lang="en-US" altLang="zh-CN" b="1" dirty="0"/>
+              <a:t>&amp;</a:t>
+            </a:r>
+            <a:r>
+              <a:rPr lang="zh-CN" altLang="en-US" b="1" dirty="0"/>
+              <a:t>做：</a:t>
+            </a:r>
+            <a:r>
+              <a:rPr lang="zh-CN" altLang="en-US" dirty="0"/>
+              <a:t>强调存在感、乐于分享、努力学习</a:t>
+            </a:r>
+            <a:endParaRPr lang="en-US" altLang="zh-CN" dirty="0"/>
+          </a:p>
+          <a:p>
+            <a:r>
+              <a:rPr lang="zh-CN" altLang="en-US" b="1" dirty="0"/>
+              <a:t>痛点：</a:t>
+            </a:r>
+            <a:r>
+              <a:rPr lang="en-US" altLang="zh-CN" dirty="0"/>
+              <a:t>P</a:t>
+            </a:r>
+            <a:r>
+              <a:rPr lang="zh-CN" altLang="en-US" dirty="0"/>
+              <a:t>图学习成本太高、存在感低、人格误解</a:t>
+            </a:r>
+            <a:endParaRPr lang="en-US" altLang="zh-CN" b="1" dirty="0"/>
+          </a:p>
+          <a:p>
+            <a:r>
+              <a:rPr lang="zh-CN" altLang="en-US" b="1" dirty="0"/>
+              <a:t>获得：</a:t>
+            </a:r>
+            <a:r>
+              <a:rPr lang="zh-CN" altLang="en-US" dirty="0"/>
+              <a:t>优质轻量化</a:t>
+            </a:r>
+            <a:r>
+              <a:rPr lang="en-US" altLang="zh-CN" dirty="0"/>
+              <a:t>P</a:t>
+            </a:r>
+            <a:r>
+              <a:rPr lang="zh-CN" altLang="en-US" dirty="0"/>
+              <a:t>图软件</a:t>
+            </a:r>
+          </a:p>
+        </p:txBody>
+      </p:sp>
+      <p:grpSp>
+        <p:nvGrpSpPr>
+          <p:cNvPr id="81" name="组合 80">
+            <a:extLst>
+              <a:ext uri="{FF2B5EF4-FFF2-40B4-BE49-F238E27FC236}">
+                <a16:creationId xmlns:a16="http://schemas.microsoft.com/office/drawing/2014/main" id="{AC0624BE-5882-2B7E-E217-6574E103075D}"/>
+              </a:ext>
+            </a:extLst>
+          </p:cNvPr>
+          <p:cNvGrpSpPr/>
+          <p:nvPr/>
+        </p:nvGrpSpPr>
+        <p:grpSpPr>
+          <a:xfrm rot="511568">
+            <a:off x="5579373" y="5771580"/>
+            <a:ext cx="1440042" cy="695681"/>
+            <a:chOff x="8707886" y="839454"/>
+            <a:chExt cx="1440042" cy="496377"/>
+          </a:xfrm>
+        </p:grpSpPr>
+        <p:pic>
+          <p:nvPicPr>
+            <p:cNvPr id="82" name="图片 81">
+              <a:extLst>
+                <a:ext uri="{FF2B5EF4-FFF2-40B4-BE49-F238E27FC236}">
+                  <a16:creationId xmlns:a16="http://schemas.microsoft.com/office/drawing/2014/main" id="{724CC70C-DEA0-E305-5CEA-24F3E827433E}"/>
+                </a:ext>
+              </a:extLst>
+            </p:cNvPr>
+            <p:cNvPicPr>
+              <a:picLocks noChangeAspect="1"/>
+            </p:cNvPicPr>
+            <p:nvPr/>
+          </p:nvPicPr>
+          <p:blipFill>
+            <a:blip r:embed="rId3">
+              <a:extLst>
+                <a:ext uri="{28A0092B-C50C-407E-A947-70E740481C1C}">
+                  <a14:useLocalDpi xmlns:a14="http://schemas.microsoft.com/office/drawing/2010/main" val="0"/>
+                </a:ext>
+              </a:extLst>
+            </a:blip>
+            <a:stretch>
+              <a:fillRect/>
+            </a:stretch>
+          </p:blipFill>
+          <p:spPr>
+            <a:xfrm rot="10311205">
+              <a:off x="8707886" y="839454"/>
+              <a:ext cx="1440042" cy="496377"/>
+            </a:xfrm>
+            <a:prstGeom prst="rect">
+              <a:avLst/>
+            </a:prstGeom>
+          </p:spPr>
+        </p:pic>
+        <p:sp>
+          <p:nvSpPr>
+            <p:cNvPr id="83" name="文本框 82">
+              <a:extLst>
+                <a:ext uri="{FF2B5EF4-FFF2-40B4-BE49-F238E27FC236}">
+                  <a16:creationId xmlns:a16="http://schemas.microsoft.com/office/drawing/2014/main" id="{026DD1AB-81FC-D6F5-4552-DB045477659F}"/>
+                </a:ext>
+              </a:extLst>
+            </p:cNvPr>
+            <p:cNvSpPr txBox="1"/>
+            <p:nvPr/>
+          </p:nvSpPr>
+          <p:spPr>
+            <a:xfrm rot="21104877">
+              <a:off x="8770108" y="979602"/>
+              <a:ext cx="1339109" cy="285483"/>
+            </a:xfrm>
+            <a:prstGeom prst="rect">
+              <a:avLst/>
+            </a:prstGeom>
+            <a:noFill/>
+          </p:spPr>
+          <p:txBody>
+            <a:bodyPr wrap="square" rtlCol="0">
+              <a:spAutoFit/>
+            </a:bodyPr>
+            <a:lstStyle/>
+            <a:p>
+              <a:r>
+                <a:rPr lang="zh-CN" altLang="en-US" sz="1000" dirty="0"/>
+                <a:t>被别人误解为不愿意分享的人</a:t>
+              </a:r>
+            </a:p>
+          </p:txBody>
+        </p:sp>
+      </p:grpSp>
+      <p:grpSp>
+        <p:nvGrpSpPr>
+          <p:cNvPr id="6" name="组合 5">
+            <a:extLst>
+              <a:ext uri="{FF2B5EF4-FFF2-40B4-BE49-F238E27FC236}">
+                <a16:creationId xmlns:a16="http://schemas.microsoft.com/office/drawing/2014/main" id="{FD352190-F3F0-B324-A75F-B7638271A873}"/>
+              </a:ext>
+            </a:extLst>
+          </p:cNvPr>
+          <p:cNvGrpSpPr/>
+          <p:nvPr/>
+        </p:nvGrpSpPr>
+        <p:grpSpPr>
+          <a:xfrm rot="1787488">
+            <a:off x="9870843" y="2009158"/>
+            <a:ext cx="1602761" cy="695682"/>
+            <a:chOff x="8707066" y="819422"/>
+            <a:chExt cx="1602761" cy="496377"/>
+          </a:xfrm>
+        </p:grpSpPr>
+        <p:pic>
+          <p:nvPicPr>
+            <p:cNvPr id="10" name="图片 9">
+              <a:extLst>
+                <a:ext uri="{FF2B5EF4-FFF2-40B4-BE49-F238E27FC236}">
+                  <a16:creationId xmlns:a16="http://schemas.microsoft.com/office/drawing/2014/main" id="{AA1276F7-91E2-5AD4-5929-4E345103B8F2}"/>
+                </a:ext>
+              </a:extLst>
+            </p:cNvPr>
+            <p:cNvPicPr>
+              <a:picLocks noChangeAspect="1"/>
+            </p:cNvPicPr>
+            <p:nvPr/>
+          </p:nvPicPr>
+          <p:blipFill>
+            <a:blip r:embed="rId3">
+              <a:extLst>
+                <a:ext uri="{28A0092B-C50C-407E-A947-70E740481C1C}">
+                  <a14:useLocalDpi xmlns:a14="http://schemas.microsoft.com/office/drawing/2010/main" val="0"/>
+                </a:ext>
+              </a:extLst>
+            </a:blip>
+            <a:stretch>
+              <a:fillRect/>
+            </a:stretch>
+          </p:blipFill>
+          <p:spPr>
+            <a:xfrm rot="10311205">
+              <a:off x="8707066" y="819422"/>
+              <a:ext cx="1602761" cy="496377"/>
+            </a:xfrm>
+            <a:prstGeom prst="rect">
+              <a:avLst/>
+            </a:prstGeom>
+          </p:spPr>
+        </p:pic>
+        <p:sp>
+          <p:nvSpPr>
+            <p:cNvPr id="11" name="文本框 10">
+              <a:extLst>
+                <a:ext uri="{FF2B5EF4-FFF2-40B4-BE49-F238E27FC236}">
+                  <a16:creationId xmlns:a16="http://schemas.microsoft.com/office/drawing/2014/main" id="{A9409D63-87E5-A162-B2DD-12AFB25DAEC2}"/>
+                </a:ext>
+              </a:extLst>
+            </p:cNvPr>
+            <p:cNvSpPr txBox="1"/>
+            <p:nvPr/>
+          </p:nvSpPr>
+          <p:spPr>
+            <a:xfrm rot="21104877">
+              <a:off x="8773061" y="961517"/>
+              <a:ext cx="1463112" cy="285483"/>
+            </a:xfrm>
+            <a:prstGeom prst="rect">
+              <a:avLst/>
+            </a:prstGeom>
+            <a:noFill/>
+          </p:spPr>
+          <p:txBody>
+            <a:bodyPr wrap="square" rtlCol="0">
+              <a:spAutoFit/>
+            </a:bodyPr>
+            <a:lstStyle/>
+            <a:p>
+              <a:r>
+                <a:rPr lang="zh-CN" altLang="en-US" sz="1000" dirty="0"/>
+                <a:t>移动端图片处理软件进入市场并受到喜爱</a:t>
+              </a:r>
+            </a:p>
+          </p:txBody>
+        </p:sp>
+      </p:grpSp>
+      <p:grpSp>
+        <p:nvGrpSpPr>
+          <p:cNvPr id="21" name="组合 20">
+            <a:extLst>
+              <a:ext uri="{FF2B5EF4-FFF2-40B4-BE49-F238E27FC236}">
+                <a16:creationId xmlns:a16="http://schemas.microsoft.com/office/drawing/2014/main" id="{568C6218-A228-5DDA-69EE-2533A4B9D530}"/>
+              </a:ext>
+            </a:extLst>
+          </p:cNvPr>
+          <p:cNvGrpSpPr/>
+          <p:nvPr/>
+        </p:nvGrpSpPr>
+        <p:grpSpPr>
+          <a:xfrm rot="311565">
+            <a:off x="4473533" y="2461327"/>
+            <a:ext cx="1543111" cy="506782"/>
+            <a:chOff x="8721110" y="971970"/>
+            <a:chExt cx="1543111" cy="361595"/>
+          </a:xfrm>
+        </p:grpSpPr>
+        <p:pic>
+          <p:nvPicPr>
+            <p:cNvPr id="22" name="图片 21">
+              <a:extLst>
+                <a:ext uri="{FF2B5EF4-FFF2-40B4-BE49-F238E27FC236}">
+                  <a16:creationId xmlns:a16="http://schemas.microsoft.com/office/drawing/2014/main" id="{4AA1781D-0F19-2655-03B5-B99A042B01B2}"/>
+                </a:ext>
+              </a:extLst>
+            </p:cNvPr>
+            <p:cNvPicPr>
+              <a:picLocks noChangeAspect="1"/>
+            </p:cNvPicPr>
+            <p:nvPr/>
+          </p:nvPicPr>
+          <p:blipFill>
+            <a:blip r:embed="rId3">
+              <a:extLst>
+                <a:ext uri="{28A0092B-C50C-407E-A947-70E740481C1C}">
+                  <a14:useLocalDpi xmlns:a14="http://schemas.microsoft.com/office/drawing/2010/main" val="0"/>
+                </a:ext>
+              </a:extLst>
+            </a:blip>
+            <a:stretch>
+              <a:fillRect/>
+            </a:stretch>
+          </p:blipFill>
+          <p:spPr>
+            <a:xfrm rot="10311205">
+              <a:off x="8721110" y="971970"/>
+              <a:ext cx="1471427" cy="361595"/>
+            </a:xfrm>
+            <a:prstGeom prst="rect">
+              <a:avLst/>
+            </a:prstGeom>
+          </p:spPr>
+        </p:pic>
+        <p:sp>
+          <p:nvSpPr>
+            <p:cNvPr id="40" name="文本框 39">
+              <a:extLst>
+                <a:ext uri="{FF2B5EF4-FFF2-40B4-BE49-F238E27FC236}">
+                  <a16:creationId xmlns:a16="http://schemas.microsoft.com/office/drawing/2014/main" id="{B0A4FEF5-D05B-F800-CC5D-91318027972A}"/>
+                </a:ext>
+              </a:extLst>
+            </p:cNvPr>
+            <p:cNvSpPr txBox="1"/>
+            <p:nvPr/>
+          </p:nvSpPr>
+          <p:spPr>
+            <a:xfrm rot="21104877">
+              <a:off x="8786108" y="1067736"/>
+              <a:ext cx="1478113" cy="175682"/>
+            </a:xfrm>
+            <a:prstGeom prst="rect">
+              <a:avLst/>
+            </a:prstGeom>
+            <a:noFill/>
+          </p:spPr>
+          <p:txBody>
+            <a:bodyPr wrap="square" rtlCol="0">
+              <a:spAutoFit/>
+            </a:bodyPr>
+            <a:lstStyle/>
+            <a:p>
+              <a:r>
+                <a:rPr lang="zh-CN" altLang="en-US" sz="1000" dirty="0"/>
+                <a:t>原来我加过你好友啊</a:t>
               </a:r>
             </a:p>
           </p:txBody>

</xml_diff>